<commit_message>
finishing the app ... (Movies app)
</commit_message>
<xml_diff>
--- a/7. Working with the DOM (Browser HTML Code) in JavaScript/docs/Introduction.pptx
+++ b/7. Working with the DOM (Browser HTML Code) in JavaScript/docs/Introduction.pptx
@@ -232,7 +232,7 @@
           <a:p>
             <a:fld id="{45C7D1C9-5613-486A-886A-E8B9CEE00FF6}" type="datetimeFigureOut">
               <a:rPr lang="en-US" smtClean="0"/>
-              <a:t>9/11/2021</a:t>
+              <a:t>9/13/2021</a:t>
             </a:fld>
             <a:endParaRPr lang="en-US"/>
           </a:p>
@@ -799,7 +799,7 @@
           <a:p>
             <a:fld id="{3A16FB0B-203D-437B-9C92-84EB95E2527D}" type="datetimeFigureOut">
               <a:rPr lang="en-US" smtClean="0"/>
-              <a:t>9/11/2021</a:t>
+              <a:t>9/13/2021</a:t>
             </a:fld>
             <a:endParaRPr lang="en-US"/>
           </a:p>
@@ -969,7 +969,7 @@
           <a:p>
             <a:fld id="{3A16FB0B-203D-437B-9C92-84EB95E2527D}" type="datetimeFigureOut">
               <a:rPr lang="en-US" smtClean="0"/>
-              <a:t>9/11/2021</a:t>
+              <a:t>9/13/2021</a:t>
             </a:fld>
             <a:endParaRPr lang="en-US"/>
           </a:p>
@@ -1149,7 +1149,7 @@
           <a:p>
             <a:fld id="{3A16FB0B-203D-437B-9C92-84EB95E2527D}" type="datetimeFigureOut">
               <a:rPr lang="en-US" smtClean="0"/>
-              <a:t>9/11/2021</a:t>
+              <a:t>9/13/2021</a:t>
             </a:fld>
             <a:endParaRPr lang="en-US"/>
           </a:p>
@@ -1319,7 +1319,7 @@
           <a:p>
             <a:fld id="{3A16FB0B-203D-437B-9C92-84EB95E2527D}" type="datetimeFigureOut">
               <a:rPr lang="en-US" smtClean="0"/>
-              <a:t>9/11/2021</a:t>
+              <a:t>9/13/2021</a:t>
             </a:fld>
             <a:endParaRPr lang="en-US"/>
           </a:p>
@@ -1565,7 +1565,7 @@
           <a:p>
             <a:fld id="{3A16FB0B-203D-437B-9C92-84EB95E2527D}" type="datetimeFigureOut">
               <a:rPr lang="en-US" smtClean="0"/>
-              <a:t>9/11/2021</a:t>
+              <a:t>9/13/2021</a:t>
             </a:fld>
             <a:endParaRPr lang="en-US"/>
           </a:p>
@@ -1797,7 +1797,7 @@
           <a:p>
             <a:fld id="{3A16FB0B-203D-437B-9C92-84EB95E2527D}" type="datetimeFigureOut">
               <a:rPr lang="en-US" smtClean="0"/>
-              <a:t>9/11/2021</a:t>
+              <a:t>9/13/2021</a:t>
             </a:fld>
             <a:endParaRPr lang="en-US"/>
           </a:p>
@@ -2164,7 +2164,7 @@
           <a:p>
             <a:fld id="{3A16FB0B-203D-437B-9C92-84EB95E2527D}" type="datetimeFigureOut">
               <a:rPr lang="en-US" smtClean="0"/>
-              <a:t>9/11/2021</a:t>
+              <a:t>9/13/2021</a:t>
             </a:fld>
             <a:endParaRPr lang="en-US"/>
           </a:p>
@@ -2282,7 +2282,7 @@
           <a:p>
             <a:fld id="{3A16FB0B-203D-437B-9C92-84EB95E2527D}" type="datetimeFigureOut">
               <a:rPr lang="en-US" smtClean="0"/>
-              <a:t>9/11/2021</a:t>
+              <a:t>9/13/2021</a:t>
             </a:fld>
             <a:endParaRPr lang="en-US"/>
           </a:p>
@@ -2377,7 +2377,7 @@
           <a:p>
             <a:fld id="{3A16FB0B-203D-437B-9C92-84EB95E2527D}" type="datetimeFigureOut">
               <a:rPr lang="en-US" smtClean="0"/>
-              <a:t>9/11/2021</a:t>
+              <a:t>9/13/2021</a:t>
             </a:fld>
             <a:endParaRPr lang="en-US"/>
           </a:p>
@@ -2654,7 +2654,7 @@
           <a:p>
             <a:fld id="{3A16FB0B-203D-437B-9C92-84EB95E2527D}" type="datetimeFigureOut">
               <a:rPr lang="en-US" smtClean="0"/>
-              <a:t>9/11/2021</a:t>
+              <a:t>9/13/2021</a:t>
             </a:fld>
             <a:endParaRPr lang="en-US"/>
           </a:p>
@@ -2907,7 +2907,7 @@
           <a:p>
             <a:fld id="{3A16FB0B-203D-437B-9C92-84EB95E2527D}" type="datetimeFigureOut">
               <a:rPr lang="en-US" smtClean="0"/>
-              <a:t>9/11/2021</a:t>
+              <a:t>9/13/2021</a:t>
             </a:fld>
             <a:endParaRPr lang="en-US"/>
           </a:p>
@@ -3120,7 +3120,7 @@
           <a:p>
             <a:fld id="{3A16FB0B-203D-437B-9C92-84EB95E2527D}" type="datetimeFigureOut">
               <a:rPr lang="en-US" smtClean="0"/>
-              <a:t>9/11/2021</a:t>
+              <a:t>9/13/2021</a:t>
             </a:fld>
             <a:endParaRPr lang="en-US"/>
           </a:p>
@@ -3821,10 +3821,6 @@
               </a:rPr>
               <a:t>Children, Descendants, Parent &amp; Ancestors</a:t>
             </a:r>
-            <a:endParaRPr lang="en-US" sz="2800" b="1" dirty="0" smtClean="0">
-              <a:ea typeface="Segoe UI Black" panose="020B0A02040204020203" pitchFamily="34" charset="0"/>
-              <a:cs typeface="Segoe UI Semibold" panose="020B0702040204020203" pitchFamily="34" charset="0"/>
-            </a:endParaRPr>
           </a:p>
         </p:txBody>
       </p:sp>
@@ -5375,10 +5371,6 @@
               </a:rPr>
               <a:t>Traversing the DOM</a:t>
             </a:r>
-            <a:endParaRPr lang="en-US" sz="2800" b="1" dirty="0" smtClean="0">
-              <a:ea typeface="Segoe UI Black" panose="020B0A02040204020203" pitchFamily="34" charset="0"/>
-              <a:cs typeface="Segoe UI Semibold" panose="020B0702040204020203" pitchFamily="34" charset="0"/>
-            </a:endParaRPr>
           </a:p>
         </p:txBody>
       </p:sp>
@@ -6120,10 +6112,6 @@
               </a:rPr>
               <a:t>Styling DOM Elements</a:t>
             </a:r>
-            <a:endParaRPr lang="en-US" sz="2800" b="1" dirty="0" smtClean="0">
-              <a:ea typeface="Segoe UI Black" panose="020B0A02040204020203" pitchFamily="34" charset="0"/>
-              <a:cs typeface="Segoe UI Semibold" panose="020B0702040204020203" pitchFamily="34" charset="0"/>
-            </a:endParaRPr>
           </a:p>
         </p:txBody>
       </p:sp>
@@ -6941,10 +6929,6 @@
               </a:rPr>
               <a:t>Creating &amp; Inserting Elements</a:t>
             </a:r>
-            <a:endParaRPr lang="en-US" sz="2800" b="1" dirty="0" smtClean="0">
-              <a:ea typeface="Segoe UI Black" panose="020B0A02040204020203" pitchFamily="34" charset="0"/>
-              <a:cs typeface="Segoe UI Semibold" panose="020B0702040204020203" pitchFamily="34" charset="0"/>
-            </a:endParaRPr>
           </a:p>
         </p:txBody>
       </p:sp>
@@ -7237,15 +7221,7 @@
                   <a:schemeClr val="accent2"/>
                 </a:solidFill>
               </a:rPr>
-              <a:t>Prepend(), before(), after(), insertBefore</a:t>
-            </a:r>
-            <a:r>
-              <a:rPr lang="en-US" sz="2400" dirty="0" smtClean="0">
-                <a:solidFill>
-                  <a:schemeClr val="accent2"/>
-                </a:solidFill>
-              </a:rPr>
-              <a:t>()</a:t>
+              <a:t>Prepend(), before(), after(), insertBefore()</a:t>
             </a:r>
             <a:endParaRPr lang="en-US" sz="2400" dirty="0">
               <a:solidFill>
@@ -7769,10 +7745,6 @@
               </a:rPr>
               <a:t>Insertion &amp; Removal Methods</a:t>
             </a:r>
-            <a:endParaRPr lang="en-US" sz="2800" b="1" dirty="0" smtClean="0">
-              <a:ea typeface="Segoe UI Black" panose="020B0A02040204020203" pitchFamily="34" charset="0"/>
-              <a:cs typeface="Segoe UI Semibold" panose="020B0702040204020203" pitchFamily="34" charset="0"/>
-            </a:endParaRPr>
           </a:p>
         </p:txBody>
       </p:sp>
@@ -9003,10 +8975,6 @@
               </a:rPr>
               <a:t>The Document Object Model (DOM)</a:t>
             </a:r>
-            <a:endParaRPr lang="en-US" sz="2800" b="1" dirty="0" smtClean="0">
-              <a:ea typeface="Segoe UI Black" panose="020B0A02040204020203" pitchFamily="34" charset="0"/>
-              <a:cs typeface="Segoe UI Semibold" panose="020B0702040204020203" pitchFamily="34" charset="0"/>
-            </a:endParaRPr>
           </a:p>
         </p:txBody>
       </p:sp>
@@ -9814,10 +9782,6 @@
               </a:rPr>
               <a:t>Document &amp; windows</a:t>
             </a:r>
-            <a:endParaRPr lang="en-US" sz="2800" b="1" dirty="0" smtClean="0">
-              <a:ea typeface="Segoe UI Black" panose="020B0A02040204020203" pitchFamily="34" charset="0"/>
-              <a:cs typeface="Segoe UI Semibold" panose="020B0702040204020203" pitchFamily="34" charset="0"/>
-            </a:endParaRPr>
           </a:p>
         </p:txBody>
       </p:sp>
@@ -10246,10 +10210,6 @@
               </a:rPr>
               <a:t>The Document Object Model (DOM)</a:t>
             </a:r>
-            <a:endParaRPr lang="en-US" sz="2800" b="1" dirty="0" smtClean="0">
-              <a:ea typeface="Segoe UI Black" panose="020B0A02040204020203" pitchFamily="34" charset="0"/>
-              <a:cs typeface="Segoe UI Semibold" panose="020B0702040204020203" pitchFamily="34" charset="0"/>
-            </a:endParaRPr>
           </a:p>
         </p:txBody>
       </p:sp>
@@ -11480,10 +11440,6 @@
               </a:rPr>
               <a:t>Querying Elements</a:t>
             </a:r>
-            <a:endParaRPr lang="en-US" sz="2800" b="1" dirty="0" smtClean="0">
-              <a:ea typeface="Segoe UI Black" panose="020B0A02040204020203" pitchFamily="34" charset="0"/>
-              <a:cs typeface="Segoe UI Semibold" panose="020B0702040204020203" pitchFamily="34" charset="0"/>
-            </a:endParaRPr>
           </a:p>
         </p:txBody>
       </p:sp>
@@ -12048,10 +12004,6 @@
               </a:rPr>
               <a:t>Nodes &amp; Elements</a:t>
             </a:r>
-            <a:endParaRPr lang="en-US" sz="2800" b="1" dirty="0" smtClean="0">
-              <a:ea typeface="Segoe UI Black" panose="020B0A02040204020203" pitchFamily="34" charset="0"/>
-              <a:cs typeface="Segoe UI Semibold" panose="020B0702040204020203" pitchFamily="34" charset="0"/>
-            </a:endParaRPr>
           </a:p>
         </p:txBody>
       </p:sp>
@@ -12821,10 +12773,6 @@
               </a:rPr>
               <a:t>Evaluating &amp; Manipulating Elements </a:t>
             </a:r>
-            <a:endParaRPr lang="en-US" sz="2800" b="1" dirty="0" smtClean="0">
-              <a:ea typeface="Segoe UI Black" panose="020B0A02040204020203" pitchFamily="34" charset="0"/>
-              <a:cs typeface="Segoe UI Semibold" panose="020B0702040204020203" pitchFamily="34" charset="0"/>
-            </a:endParaRPr>
           </a:p>
         </p:txBody>
       </p:sp>
@@ -13963,10 +13911,6 @@
               </a:rPr>
               <a:t>Attributes vs Properties</a:t>
             </a:r>
-            <a:endParaRPr lang="en-US" sz="2800" b="1" dirty="0" smtClean="0">
-              <a:ea typeface="Segoe UI Black" panose="020B0A02040204020203" pitchFamily="34" charset="0"/>
-              <a:cs typeface="Segoe UI Semibold" panose="020B0702040204020203" pitchFamily="34" charset="0"/>
-            </a:endParaRPr>
           </a:p>
         </p:txBody>
       </p:sp>

</xml_diff>